<commit_message>
Finalise Solution pitch slides
</commit_message>
<xml_diff>
--- a/core_29(team ATOM).pptx
+++ b/core_29(team ATOM).pptx
@@ -8001,7 +8001,7 @@
         </p:nvGrpSpPr>
         <p:grpSpPr>
           <a:xfrm>
-            <a:off x="9683988" y="1449656"/>
+            <a:off x="9683988" y="1474108"/>
             <a:ext cx="8242694" cy="6564992"/>
             <a:chOff x="0" y="0"/>
             <a:chExt cx="3845713" cy="1629801"/>
@@ -8164,7 +8164,7 @@
         <p:spPr>
           <a:xfrm>
             <a:off x="637941" y="2422317"/>
-            <a:ext cx="7807901" cy="4739759"/>
+            <a:ext cx="7807901" cy="4062651"/>
           </a:xfrm>
           <a:prstGeom prst="rect">
             <a:avLst/>
@@ -8221,7 +8221,7 @@
                 <a:latin typeface="Times New Roman" panose="02020603050405020304" pitchFamily="18" charset="0"/>
                 <a:cs typeface="Times New Roman" panose="02020603050405020304" pitchFamily="18" charset="0"/>
               </a:rPr>
-              <a:t>3D Globe Map:</a:t>
+              <a:t>Globe Map:</a:t>
             </a:r>
             <a:r>
               <a:rPr lang="en-US" sz="4400" b="0" i="0" dirty="0">
@@ -8232,11 +8232,8 @@
                 <a:latin typeface="Times New Roman" panose="02020603050405020304" pitchFamily="18" charset="0"/>
                 <a:cs typeface="Times New Roman" panose="02020603050405020304" pitchFamily="18" charset="0"/>
               </a:rPr>
-              <a:t> Interactive global wildlife tracking.</a:t>
+              <a:t> Interactive 3D globe </a:t>
             </a:r>
-          </a:p>
-          <a:p>
-            <a:pPr algn="just"/>
             <a:r>
               <a:rPr lang="en-US" sz="4400" b="1" i="0" dirty="0">
                 <a:solidFill>
@@ -8246,7 +8243,7 @@
                 <a:latin typeface="Times New Roman" panose="02020603050405020304" pitchFamily="18" charset="0"/>
                 <a:cs typeface="Times New Roman" panose="02020603050405020304" pitchFamily="18" charset="0"/>
               </a:rPr>
-              <a:t>Species Habitat:</a:t>
+              <a:t>Species Overview:</a:t>
             </a:r>
             <a:r>
               <a:rPr lang="en-US" sz="4400" b="0" i="0" dirty="0">
@@ -8257,7 +8254,7 @@
                 <a:latin typeface="Times New Roman" panose="02020603050405020304" pitchFamily="18" charset="0"/>
                 <a:cs typeface="Times New Roman" panose="02020603050405020304" pitchFamily="18" charset="0"/>
               </a:rPr>
-              <a:t> Discover where animals live.</a:t>
+              <a:t> Discover interesting facts about animals</a:t>
             </a:r>
           </a:p>
           <a:p>
@@ -8305,7 +8302,7 @@
                 <a:latin typeface="Times New Roman" panose="02020603050405020304" pitchFamily="18" charset="0"/>
                 <a:cs typeface="Times New Roman" panose="02020603050405020304" pitchFamily="18" charset="0"/>
               </a:rPr>
-              <a:t>City	Wildlife:</a:t>
+              <a:t>City	Overview:</a:t>
             </a:r>
             <a:r>
               <a:rPr lang="en-US" sz="4400" b="0" i="0" dirty="0">
@@ -8316,8 +8313,26 @@
                 <a:latin typeface="Times New Roman" panose="02020603050405020304" pitchFamily="18" charset="0"/>
                 <a:cs typeface="Times New Roman" panose="02020603050405020304" pitchFamily="18" charset="0"/>
               </a:rPr>
-              <a:t> Explore animals in your city.</a:t>
+              <a:t> Explore </a:t>
             </a:r>
+            <a:r>
+              <a:rPr lang="en-US" sz="4400" dirty="0">
+                <a:solidFill>
+                  <a:srgbClr val="F8FAFF"/>
+                </a:solidFill>
+                <a:latin typeface="Times New Roman" panose="02020603050405020304" pitchFamily="18" charset="0"/>
+                <a:cs typeface="Times New Roman" panose="02020603050405020304" pitchFamily="18" charset="0"/>
+              </a:rPr>
+              <a:t>different cities.</a:t>
+            </a:r>
+            <a:endParaRPr lang="en-US" sz="4400" b="0" i="0" dirty="0">
+              <a:solidFill>
+                <a:srgbClr val="F8FAFF"/>
+              </a:solidFill>
+              <a:effectLst/>
+              <a:latin typeface="Times New Roman" panose="02020603050405020304" pitchFamily="18" charset="0"/>
+              <a:cs typeface="Times New Roman" panose="02020603050405020304" pitchFamily="18" charset="0"/>
+            </a:endParaRPr>
           </a:p>
           <a:p>
             <a:pPr algn="just"/>
@@ -9710,7 +9725,7 @@
         <p:spPr>
           <a:xfrm>
             <a:off x="8562068" y="1400062"/>
-            <a:ext cx="8998632" cy="2708434"/>
+            <a:ext cx="8998632" cy="2031325"/>
           </a:xfrm>
           <a:prstGeom prst="rect">
             <a:avLst/>
@@ -9758,16 +9773,23 @@
               <a:buChar char="•"/>
             </a:pPr>
             <a:r>
-              <a:rPr lang="en-US" sz="4400" b="0" i="0" dirty="0">
+              <a:rPr lang="en-US" sz="4400" dirty="0">
                 <a:solidFill>
                   <a:srgbClr val="F8FAFF"/>
                 </a:solidFill>
-                <a:effectLst/>
                 <a:latin typeface="Times New Roman" panose="02020603050405020304" pitchFamily="18" charset="0"/>
                 <a:cs typeface="Times New Roman" panose="02020603050405020304" pitchFamily="18" charset="0"/>
               </a:rPr>
-              <a:t>Real-time updates on wildlife info and alerts.</a:t>
+              <a:t>Easy to learn and understand.</a:t>
             </a:r>
+            <a:endParaRPr lang="en-US" sz="4400" b="0" i="0" dirty="0">
+              <a:solidFill>
+                <a:srgbClr val="F8FAFF"/>
+              </a:solidFill>
+              <a:effectLst/>
+              <a:latin typeface="Times New Roman" panose="02020603050405020304" pitchFamily="18" charset="0"/>
+              <a:cs typeface="Times New Roman" panose="02020603050405020304" pitchFamily="18" charset="0"/>
+            </a:endParaRPr>
           </a:p>
         </p:txBody>
       </p:sp>
@@ -9925,20 +9947,19 @@
           </a:bodyPr>
           <a:lstStyle/>
           <a:p>
-            <a:pPr marL="571500" indent="-571500" algn="just">
+            <a:pPr algn="just">
               <a:lnSpc>
                 <a:spcPct val="150000"/>
               </a:lnSpc>
-              <a:buFont typeface="Arial" panose="020B0604020202020204" pitchFamily="34" charset="0"/>
-              <a:buChar char="•"/>
             </a:pPr>
             <a:r>
-              <a:rPr lang="en-US" sz="4400" b="0" i="0" dirty="0">
-                <a:effectLst/>
+              <a:rPr lang="en-US" sz="4400" dirty="0">
                 <a:latin typeface="Times New Roman" panose="02020603050405020304" pitchFamily="18" charset="0"/>
+                <a:ea typeface="IBM Plex Mono"/>
                 <a:cs typeface="Times New Roman" panose="02020603050405020304" pitchFamily="18" charset="0"/>
+                <a:sym typeface="IBM Plex Mono"/>
               </a:rPr>
-              <a:t>Your Wildlife Journey Starts Here</a:t>
+              <a:t>Future Implementations:</a:t>
             </a:r>
           </a:p>
           <a:p>
@@ -9952,24 +9973,12 @@
             <a:r>
               <a:rPr lang="en-US" sz="4400" dirty="0">
                 <a:latin typeface="Times New Roman" panose="02020603050405020304" pitchFamily="18" charset="0"/>
+                <a:ea typeface="IBM Plex Mono"/>
                 <a:cs typeface="Times New Roman" panose="02020603050405020304" pitchFamily="18" charset="0"/>
+                <a:sym typeface="IBM Plex Mono"/>
               </a:rPr>
-              <a:t>User Friendly</a:t>
+              <a:t>Wildlife alerts near your location</a:t>
             </a:r>
-            <a:r>
-              <a:rPr lang="en-US" sz="4400" b="0" i="0" dirty="0">
-                <a:effectLst/>
-                <a:latin typeface="Times New Roman" panose="02020603050405020304" pitchFamily="18" charset="0"/>
-                <a:cs typeface="Times New Roman" panose="02020603050405020304" pitchFamily="18" charset="0"/>
-              </a:rPr>
-              <a:t> Dashboard for Every User</a:t>
-            </a:r>
-            <a:endParaRPr lang="en-US" sz="4400" dirty="0">
-              <a:latin typeface="Times New Roman" panose="02020603050405020304" pitchFamily="18" charset="0"/>
-              <a:ea typeface="IBM Plex Mono"/>
-              <a:cs typeface="Times New Roman" panose="02020603050405020304" pitchFamily="18" charset="0"/>
-              <a:sym typeface="IBM Plex Mono"/>
-            </a:endParaRPr>
           </a:p>
         </p:txBody>
       </p:sp>
@@ -11487,7 +11496,7 @@
         <p:spPr>
           <a:xfrm>
             <a:off x="703648" y="2007566"/>
-            <a:ext cx="11520396" cy="2708434"/>
+            <a:ext cx="11520396" cy="2031325"/>
           </a:xfrm>
           <a:prstGeom prst="rect">
             <a:avLst/>
@@ -11512,8 +11521,22 @@
                 <a:latin typeface="Times New Roman" panose="02020603050405020304" pitchFamily="18" charset="0"/>
                 <a:cs typeface="Times New Roman" panose="02020603050405020304" pitchFamily="18" charset="0"/>
               </a:rPr>
-              <a:t>Interactive 3D globe with real-time animal tracking.</a:t>
+              <a:t>Interactive 3D globe.</a:t>
             </a:r>
+          </a:p>
+          <a:p>
+            <a:pPr algn="just">
+              <a:buFont typeface="Arial" panose="020B0604020202020204" pitchFamily="34" charset="0"/>
+              <a:buChar char="•"/>
+            </a:pPr>
+            <a:endParaRPr lang="en-US" sz="4400" b="0" i="0" dirty="0">
+              <a:solidFill>
+                <a:srgbClr val="F8FAFF"/>
+              </a:solidFill>
+              <a:effectLst/>
+              <a:latin typeface="Times New Roman" panose="02020603050405020304" pitchFamily="18" charset="0"/>
+              <a:cs typeface="Times New Roman" panose="02020603050405020304" pitchFamily="18" charset="0"/>
+            </a:endParaRPr>
           </a:p>
           <a:p>
             <a:pPr algn="just">
@@ -11529,7 +11552,7 @@
                 <a:latin typeface="Times New Roman" panose="02020603050405020304" pitchFamily="18" charset="0"/>
                 <a:cs typeface="Times New Roman" panose="02020603050405020304" pitchFamily="18" charset="0"/>
               </a:rPr>
-              <a:t>Zoom in to explore habitats and migration patterns.</a:t>
+              <a:t>Zoom in and out to get a clearer view of the area.</a:t>
             </a:r>
           </a:p>
         </p:txBody>
@@ -12134,8 +12157,8 @@
         </p:nvGrpSpPr>
         <p:grpSpPr>
           <a:xfrm>
-            <a:off x="4328177" y="5503148"/>
-            <a:ext cx="13731223" cy="2916952"/>
+            <a:off x="4328177" y="5503147"/>
+            <a:ext cx="13731223" cy="3480993"/>
             <a:chOff x="0" y="0"/>
             <a:chExt cx="3845713" cy="1695327"/>
           </a:xfrm>
@@ -12262,7 +12285,7 @@
         <p:spPr>
           <a:xfrm>
             <a:off x="4973874" y="6182454"/>
-            <a:ext cx="12669052" cy="1354217"/>
+            <a:ext cx="12669052" cy="2708434"/>
           </a:xfrm>
           <a:prstGeom prst="rect">
             <a:avLst/>
@@ -12274,17 +12297,14 @@
           </a:bodyPr>
           <a:lstStyle/>
           <a:p>
-            <a:pPr marL="571500" indent="-571500" algn="just">
-              <a:buFont typeface="Arial" panose="020B0604020202020204" pitchFamily="34" charset="0"/>
-              <a:buChar char="•"/>
-            </a:pPr>
+            <a:pPr algn="just"/>
             <a:r>
               <a:rPr lang="en-US" sz="4400" b="0" i="0" dirty="0">
                 <a:effectLst/>
                 <a:latin typeface="Times New Roman" panose="02020603050405020304" pitchFamily="18" charset="0"/>
                 <a:cs typeface="Times New Roman" panose="02020603050405020304" pitchFamily="18" charset="0"/>
               </a:rPr>
-              <a:t>Explore the World in 3D.</a:t>
+              <a:t>Future Implementations:</a:t>
             </a:r>
           </a:p>
           <a:p>
@@ -12300,12 +12320,21 @@
               </a:rPr>
               <a:t>Track Wildlife Movements Across the Globe.</a:t>
             </a:r>
-            <a:endParaRPr lang="en-US" sz="4400" dirty="0">
-              <a:latin typeface="Times New Roman" panose="02020603050405020304" pitchFamily="18" charset="0"/>
-              <a:ea typeface="IBM Plex Mono"/>
-              <a:cs typeface="Times New Roman" panose="02020603050405020304" pitchFamily="18" charset="0"/>
-              <a:sym typeface="IBM Plex Mono"/>
-            </a:endParaRPr>
+          </a:p>
+          <a:p>
+            <a:pPr marL="571500" indent="-571500" algn="just">
+              <a:buFont typeface="Arial" panose="020B0604020202020204" pitchFamily="34" charset="0"/>
+              <a:buChar char="•"/>
+            </a:pPr>
+            <a:r>
+              <a:rPr lang="en-US" sz="4400" dirty="0">
+                <a:latin typeface="Times New Roman" panose="02020603050405020304" pitchFamily="18" charset="0"/>
+                <a:ea typeface="IBM Plex Mono"/>
+                <a:cs typeface="Times New Roman" panose="02020603050405020304" pitchFamily="18" charset="0"/>
+                <a:sym typeface="IBM Plex Mono"/>
+              </a:rPr>
+              <a:t>Detailed analysis and pattern recognition when you click on a city.</a:t>
+            </a:r>
           </a:p>
         </p:txBody>
       </p:sp>
@@ -13043,7 +13072,7 @@
         </p:nvGrpSpPr>
         <p:grpSpPr>
           <a:xfrm>
-            <a:off x="-460312" y="-201041"/>
+            <a:off x="-460312" y="-135382"/>
             <a:ext cx="19208624" cy="10689082"/>
             <a:chOff x="0" y="0"/>
             <a:chExt cx="25611499" cy="14252110"/>
@@ -13313,7 +13342,7 @@
                 <a:cs typeface="Times New Roman" panose="02020603050405020304" pitchFamily="18" charset="0"/>
                 <a:sym typeface="IBM Plex Mono Bold"/>
               </a:rPr>
-              <a:t>Species Analysis</a:t>
+              <a:t>Species Overview</a:t>
             </a:r>
           </a:p>
         </p:txBody>
@@ -13339,10 +13368,7 @@
           </a:bodyPr>
           <a:lstStyle/>
           <a:p>
-            <a:pPr marL="571500" indent="-571500" algn="just">
-              <a:buFont typeface="Arial" panose="020B0604020202020204" pitchFamily="34" charset="0"/>
-              <a:buChar char="•"/>
-            </a:pPr>
+            <a:pPr algn="just"/>
             <a:r>
               <a:rPr lang="en-IN" sz="4400" b="0" i="0" dirty="0">
                 <a:solidFill>
@@ -13352,8 +13378,17 @@
                 <a:latin typeface="Times New Roman" panose="02020603050405020304" pitchFamily="18" charset="0"/>
                 <a:cs typeface="Times New Roman" panose="02020603050405020304" pitchFamily="18" charset="0"/>
               </a:rPr>
-              <a:t>Discover Where Wildlife Thrives</a:t>
+              <a:t>Future Implementations:</a:t>
             </a:r>
+            <a:endParaRPr lang="en-US" sz="4400" b="0" i="0" dirty="0">
+              <a:solidFill>
+                <a:srgbClr val="FFFFFF"/>
+              </a:solidFill>
+              <a:effectLst/>
+              <a:latin typeface="Times New Roman" panose="02020603050405020304" pitchFamily="18" charset="0"/>
+              <a:cs typeface="Times New Roman" panose="02020603050405020304" pitchFamily="18" charset="0"/>
+              <a:sym typeface="IBM Plex Mono"/>
+            </a:endParaRPr>
           </a:p>
           <a:p>
             <a:pPr marL="571500" indent="-571500" algn="just">
@@ -13361,25 +13396,16 @@
               <a:buChar char="•"/>
             </a:pPr>
             <a:r>
-              <a:rPr lang="en-US" sz="4400" b="0" i="0" dirty="0">
+              <a:rPr lang="en-US" sz="4400" dirty="0">
                 <a:solidFill>
-                  <a:srgbClr val="F8FAFF"/>
+                  <a:srgbClr val="FFFFFF"/>
                 </a:solidFill>
-                <a:effectLst/>
                 <a:latin typeface="Times New Roman" panose="02020603050405020304" pitchFamily="18" charset="0"/>
                 <a:cs typeface="Times New Roman" panose="02020603050405020304" pitchFamily="18" charset="0"/>
+                <a:sym typeface="IBM Plex Mono"/>
               </a:rPr>
-              <a:t>From Jungles to Oceans, Uncover Animal Habitats</a:t>
+              <a:t>Detailed information on every animal</a:t>
             </a:r>
-            <a:endParaRPr lang="en-US" sz="4400" dirty="0">
-              <a:solidFill>
-                <a:srgbClr val="FFFFFF"/>
-              </a:solidFill>
-              <a:latin typeface="Times New Roman" panose="02020603050405020304" pitchFamily="18" charset="0"/>
-              <a:ea typeface="IBM Plex Mono"/>
-              <a:cs typeface="Times New Roman" panose="02020603050405020304" pitchFamily="18" charset="0"/>
-              <a:sym typeface="IBM Plex Mono"/>
-            </a:endParaRPr>
           </a:p>
         </p:txBody>
       </p:sp>
@@ -14158,12 +14184,30 @@
               <a:buChar char="•"/>
             </a:pPr>
             <a:r>
+              <a:rPr lang="en-US" sz="4400" dirty="0">
+                <a:latin typeface="Times New Roman" panose="02020603050405020304" pitchFamily="18" charset="0"/>
+                <a:cs typeface="Times New Roman" panose="02020603050405020304" pitchFamily="18" charset="0"/>
+              </a:rPr>
+              <a:t>List of land animals from A to Z</a:t>
+            </a:r>
+            <a:endParaRPr lang="en-US" sz="4400" b="0" i="0" dirty="0">
+              <a:effectLst/>
+              <a:latin typeface="Times New Roman" panose="02020603050405020304" pitchFamily="18" charset="0"/>
+              <a:cs typeface="Times New Roman" panose="02020603050405020304" pitchFamily="18" charset="0"/>
+            </a:endParaRPr>
+          </a:p>
+          <a:p>
+            <a:pPr algn="just">
+              <a:buFont typeface="Arial" panose="020B0604020202020204" pitchFamily="34" charset="0"/>
+              <a:buChar char="•"/>
+            </a:pPr>
+            <a:r>
               <a:rPr lang="en-US" sz="4400" b="0" i="0" dirty="0">
                 <a:effectLst/>
                 <a:latin typeface="Times New Roman" panose="02020603050405020304" pitchFamily="18" charset="0"/>
                 <a:cs typeface="Times New Roman" panose="02020603050405020304" pitchFamily="18" charset="0"/>
               </a:rPr>
-              <a:t>Detailed information on species and their ecosystems.</a:t>
+              <a:t>Search Function For Ease Of Access</a:t>
             </a:r>
           </a:p>
           <a:p>
@@ -14177,21 +14221,7 @@
                 <a:latin typeface="Times New Roman" panose="02020603050405020304" pitchFamily="18" charset="0"/>
                 <a:cs typeface="Times New Roman" panose="02020603050405020304" pitchFamily="18" charset="0"/>
               </a:rPr>
-              <a:t>Filter by region, biome, or conservation status.</a:t>
-            </a:r>
-          </a:p>
-          <a:p>
-            <a:pPr algn="just">
-              <a:buFont typeface="Arial" panose="020B0604020202020204" pitchFamily="34" charset="0"/>
-              <a:buChar char="•"/>
-            </a:pPr>
-            <a:r>
-              <a:rPr lang="en-US" sz="4400" b="0" i="0" dirty="0">
-                <a:effectLst/>
-                <a:latin typeface="Times New Roman" panose="02020603050405020304" pitchFamily="18" charset="0"/>
-                <a:cs typeface="Times New Roman" panose="02020603050405020304" pitchFamily="18" charset="0"/>
-              </a:rPr>
-              <a:t>Educational content on endangered species.</a:t>
+              <a:t>Fun fact for the animal of your choice</a:t>
             </a:r>
           </a:p>
         </p:txBody>
@@ -15789,7 +15819,7 @@
                 <a:cs typeface="Times New Roman" panose="02020603050405020304" pitchFamily="18" charset="0"/>
                 <a:sym typeface="IBM Plex Mono Bold"/>
               </a:rPr>
-              <a:t>City Species Analysis</a:t>
+              <a:t>City Overview</a:t>
             </a:r>
           </a:p>
         </p:txBody>
@@ -15828,8 +15858,22 @@
                 <a:latin typeface="Times New Roman" panose="02020603050405020304" pitchFamily="18" charset="0"/>
                 <a:cs typeface="Times New Roman" panose="02020603050405020304" pitchFamily="18" charset="0"/>
               </a:rPr>
-              <a:t>Localized data on urban wildlife.</a:t>
+              <a:t>List Of All Major Cities</a:t>
             </a:r>
+          </a:p>
+          <a:p>
+            <a:pPr algn="just">
+              <a:buFont typeface="Arial" panose="020B0604020202020204" pitchFamily="34" charset="0"/>
+              <a:buChar char="•"/>
+            </a:pPr>
+            <a:endParaRPr lang="en-US" sz="4400" b="0" i="0" dirty="0">
+              <a:solidFill>
+                <a:srgbClr val="F8FAFF"/>
+              </a:solidFill>
+              <a:effectLst/>
+              <a:latin typeface="Times New Roman" panose="02020603050405020304" pitchFamily="18" charset="0"/>
+              <a:cs typeface="Times New Roman" panose="02020603050405020304" pitchFamily="18" charset="0"/>
+            </a:endParaRPr>
           </a:p>
           <a:p>
             <a:pPr algn="just">
@@ -15845,35 +15889,15 @@
                 <a:latin typeface="Times New Roman" panose="02020603050405020304" pitchFamily="18" charset="0"/>
                 <a:cs typeface="Times New Roman" panose="02020603050405020304" pitchFamily="18" charset="0"/>
               </a:rPr>
-              <a:t>Tips for coexisting with urban animals</a:t>
+              <a:t>Search Function For Ease Of Access</a:t>
             </a:r>
-            <a:r>
-              <a:rPr lang="en-US" sz="4400" dirty="0">
-                <a:solidFill>
-                  <a:srgbClr val="F8FAFF"/>
-                </a:solidFill>
-                <a:latin typeface="Times New Roman" panose="02020603050405020304" pitchFamily="18" charset="0"/>
-                <a:cs typeface="Times New Roman" panose="02020603050405020304" pitchFamily="18" charset="0"/>
-              </a:rPr>
-              <a:t>.</a:t>
-            </a:r>
-          </a:p>
-          <a:p>
-            <a:pPr algn="just">
-              <a:buFont typeface="Arial" panose="020B0604020202020204" pitchFamily="34" charset="0"/>
-              <a:buChar char="•"/>
-            </a:pPr>
-            <a:r>
-              <a:rPr lang="en-US" sz="4400" b="0" i="0" dirty="0">
-                <a:solidFill>
-                  <a:srgbClr val="F8FAFF"/>
-                </a:solidFill>
-                <a:effectLst/>
-                <a:latin typeface="Times New Roman" panose="02020603050405020304" pitchFamily="18" charset="0"/>
-                <a:cs typeface="Times New Roman" panose="02020603050405020304" pitchFamily="18" charset="0"/>
-              </a:rPr>
-              <a:t>Report sightings and contribute to public dataset.</a:t>
-            </a:r>
+            <a:endParaRPr lang="en-US" sz="4400" dirty="0">
+              <a:solidFill>
+                <a:srgbClr val="F8FAFF"/>
+              </a:solidFill>
+              <a:latin typeface="Times New Roman" panose="02020603050405020304" pitchFamily="18" charset="0"/>
+              <a:cs typeface="Times New Roman" panose="02020603050405020304" pitchFamily="18" charset="0"/>
+            </a:endParaRPr>
           </a:p>
         </p:txBody>
       </p:sp>
@@ -15892,7 +15916,7 @@
         <p:grpSpPr>
           <a:xfrm>
             <a:off x="4404377" y="5807948"/>
-            <a:ext cx="13353249" cy="2232079"/>
+            <a:ext cx="13353249" cy="3755152"/>
             <a:chOff x="0" y="0"/>
             <a:chExt cx="3845713" cy="1695327"/>
           </a:xfrm>
@@ -16019,7 +16043,7 @@
         <p:spPr>
           <a:xfrm>
             <a:off x="5050074" y="6487254"/>
-            <a:ext cx="9656526" cy="1354217"/>
+            <a:ext cx="9656526" cy="2708434"/>
           </a:xfrm>
           <a:prstGeom prst="rect">
             <a:avLst/>
@@ -16031,17 +16055,14 @@
           </a:bodyPr>
           <a:lstStyle/>
           <a:p>
-            <a:pPr marL="571500" indent="-571500" algn="just">
-              <a:buFont typeface="Arial" panose="020B0604020202020204" pitchFamily="34" charset="0"/>
-              <a:buChar char="•"/>
-            </a:pPr>
+            <a:pPr algn="just"/>
             <a:r>
-              <a:rPr lang="en-IN" sz="4400" b="0" i="0" dirty="0">
+              <a:rPr lang="en-US" sz="4400" b="0" i="0" dirty="0">
                 <a:effectLst/>
                 <a:latin typeface="Times New Roman" panose="02020603050405020304" pitchFamily="18" charset="0"/>
                 <a:cs typeface="Times New Roman" panose="02020603050405020304" pitchFamily="18" charset="0"/>
               </a:rPr>
-              <a:t>Wildlife in Your Backyard</a:t>
+              <a:t>Future Implementations:</a:t>
             </a:r>
           </a:p>
           <a:p>
@@ -16050,19 +16071,29 @@
               <a:buChar char="•"/>
             </a:pPr>
             <a:r>
-              <a:rPr lang="en-US" sz="4400" b="0" i="0" dirty="0">
-                <a:effectLst/>
+              <a:rPr lang="en-US" sz="4400" dirty="0">
                 <a:latin typeface="Times New Roman" panose="02020603050405020304" pitchFamily="18" charset="0"/>
+                <a:ea typeface="IBM Plex Mono"/>
                 <a:cs typeface="Times New Roman" panose="02020603050405020304" pitchFamily="18" charset="0"/>
+                <a:sym typeface="IBM Plex Mono"/>
               </a:rPr>
-              <a:t>Explore Animals Living in Your City</a:t>
+              <a:t>Overview of all animal sightings in the city</a:t>
             </a:r>
-            <a:endParaRPr lang="en-US" sz="4400" dirty="0">
-              <a:latin typeface="Times New Roman" panose="02020603050405020304" pitchFamily="18" charset="0"/>
-              <a:ea typeface="IBM Plex Mono"/>
-              <a:cs typeface="Times New Roman" panose="02020603050405020304" pitchFamily="18" charset="0"/>
-              <a:sym typeface="IBM Plex Mono"/>
-            </a:endParaRPr>
+          </a:p>
+          <a:p>
+            <a:pPr marL="571500" indent="-571500" algn="just">
+              <a:buFont typeface="Arial" panose="020B0604020202020204" pitchFamily="34" charset="0"/>
+              <a:buChar char="•"/>
+            </a:pPr>
+            <a:r>
+              <a:rPr lang="en-US" sz="4400" dirty="0">
+                <a:latin typeface="Times New Roman" panose="02020603050405020304" pitchFamily="18" charset="0"/>
+                <a:ea typeface="IBM Plex Mono"/>
+                <a:cs typeface="Times New Roman" panose="02020603050405020304" pitchFamily="18" charset="0"/>
+                <a:sym typeface="IBM Plex Mono"/>
+              </a:rPr>
+              <a:t>Habitats in the city for wildlife animals</a:t>
+            </a:r>
           </a:p>
         </p:txBody>
       </p:sp>
@@ -16966,7 +16997,7 @@
         <p:grpSpPr>
           <a:xfrm>
             <a:off x="4114800" y="1409700"/>
-            <a:ext cx="13731223" cy="5029200"/>
+            <a:ext cx="13731223" cy="6934200"/>
             <a:chOff x="0" y="0"/>
             <a:chExt cx="3845713" cy="1695327"/>
           </a:xfrm>
@@ -17093,7 +17124,7 @@
         <p:spPr>
           <a:xfrm>
             <a:off x="4806228" y="2108432"/>
-            <a:ext cx="12669052" cy="2942024"/>
+            <a:ext cx="12669052" cy="5972341"/>
           </a:xfrm>
           <a:prstGeom prst="rect">
             <a:avLst/>
@@ -17122,7 +17153,7 @@
             </a:r>
           </a:p>
           <a:p>
-            <a:pPr>
+            <a:pPr algn="l">
               <a:lnSpc>
                 <a:spcPct val="150000"/>
               </a:lnSpc>
@@ -17130,13 +17161,17 @@
               <a:buChar char="•"/>
             </a:pPr>
             <a:r>
-              <a:rPr lang="en-US" sz="4400" b="0" i="0" dirty="0">
-                <a:effectLst/>
+              <a:rPr lang="en-IN" sz="4400" dirty="0">
                 <a:latin typeface="Times New Roman" panose="02020603050405020304" pitchFamily="18" charset="0"/>
                 <a:cs typeface="Times New Roman" panose="02020603050405020304" pitchFamily="18" charset="0"/>
               </a:rPr>
-              <a:t>Share data with researchers and conservationists.</a:t>
+              <a:t>Intuitive AI program that identifies the animal in the picture taken.</a:t>
             </a:r>
+            <a:endParaRPr lang="en-IN" sz="4400" b="0" i="0" dirty="0">
+              <a:effectLst/>
+              <a:latin typeface="Times New Roman" panose="02020603050405020304" pitchFamily="18" charset="0"/>
+              <a:cs typeface="Times New Roman" panose="02020603050405020304" pitchFamily="18" charset="0"/>
+            </a:endParaRPr>
           </a:p>
           <a:p>
             <a:pPr>
@@ -17147,13 +17182,38 @@
               <a:buChar char="•"/>
             </a:pPr>
             <a:r>
-              <a:rPr lang="en-US" sz="4400" b="0" i="0" dirty="0">
-                <a:effectLst/>
+              <a:rPr lang="en-US" sz="4400" dirty="0">
                 <a:latin typeface="Times New Roman" panose="02020603050405020304" pitchFamily="18" charset="0"/>
                 <a:cs typeface="Times New Roman" panose="02020603050405020304" pitchFamily="18" charset="0"/>
               </a:rPr>
-              <a:t>Track changes over time with historical data.</a:t>
+              <a:t>Data stored in a database that is accessible by every user for the betterment of wildlife.</a:t>
             </a:r>
+            <a:endParaRPr lang="en-US" sz="4400" b="0" i="0" dirty="0">
+              <a:effectLst/>
+              <a:latin typeface="Times New Roman" panose="02020603050405020304" pitchFamily="18" charset="0"/>
+              <a:cs typeface="Times New Roman" panose="02020603050405020304" pitchFamily="18" charset="0"/>
+            </a:endParaRPr>
+          </a:p>
+          <a:p>
+            <a:pPr>
+              <a:lnSpc>
+                <a:spcPct val="150000"/>
+              </a:lnSpc>
+              <a:buFont typeface="Arial" panose="020B0604020202020204" pitchFamily="34" charset="0"/>
+              <a:buChar char="•"/>
+            </a:pPr>
+            <a:r>
+              <a:rPr lang="en-US" sz="4400" dirty="0">
+                <a:latin typeface="Times New Roman" panose="02020603050405020304" pitchFamily="18" charset="0"/>
+                <a:cs typeface="Times New Roman" panose="02020603050405020304" pitchFamily="18" charset="0"/>
+              </a:rPr>
+              <a:t>GPS activated location tracking for quick submission.</a:t>
+            </a:r>
+            <a:endParaRPr lang="en-US" sz="4400" b="0" i="0" dirty="0">
+              <a:effectLst/>
+              <a:latin typeface="Times New Roman" panose="02020603050405020304" pitchFamily="18" charset="0"/>
+              <a:cs typeface="Times New Roman" panose="02020603050405020304" pitchFamily="18" charset="0"/>
+            </a:endParaRPr>
           </a:p>
         </p:txBody>
       </p:sp>

</xml_diff>